<commit_message>
html form lecture updates
</commit_message>
<xml_diff>
--- a/unit_00/html_review/03 HTML Forms.pptx
+++ b/unit_00/html_review/03 HTML Forms.pptx
@@ -10456,10 +10456,10 @@
               <a:buChar char="•"/>
             </a:pPr>
             <a:r>
-              <a:rPr lang="en-US" sz="2400" dirty="0">
-                <a:cs typeface="Arial" panose="020B0604020202020204" pitchFamily="34" charset="0"/>
-              </a:rPr>
-              <a:t>Build example forms</a:t>
+              <a:rPr lang="en-US" sz="2400">
+                <a:cs typeface="Arial" panose="020B0604020202020204" pitchFamily="34" charset="0"/>
+              </a:rPr>
+              <a:t>Build an example form</a:t>
             </a:r>
             <a:endParaRPr lang="en-US" sz="2400" dirty="0"/>
           </a:p>
@@ -18431,10 +18431,10 @@
               <a:buChar char="•"/>
             </a:pPr>
             <a:r>
-              <a:rPr lang="en-US" sz="2400" dirty="0">
-                <a:cs typeface="Arial" panose="020B0604020202020204" pitchFamily="34" charset="0"/>
-              </a:rPr>
-              <a:t>Build example forms</a:t>
+              <a:rPr lang="en-US" sz="2400">
+                <a:cs typeface="Arial" panose="020B0604020202020204" pitchFamily="34" charset="0"/>
+              </a:rPr>
+              <a:t>Build an example form</a:t>
             </a:r>
             <a:endParaRPr lang="en-US" sz="2400" dirty="0"/>
           </a:p>

</xml_diff>